<commit_message>
Some changes were made. Please reprint and revise.
</commit_message>
<xml_diff>
--- a/finish poster.pptx
+++ b/finish poster.pptx
@@ -3957,7 +3957,7 @@
           <p:spPr>
             <a:xfrm>
               <a:off x="944082" y="5029200"/>
-              <a:ext cx="11861053" cy="12521409"/>
+              <a:ext cx="11861053" cy="11337140"/>
             </a:xfrm>
             <a:prstGeom prst="rect">
               <a:avLst/>
@@ -4000,7 +4000,7 @@
               </a:endParaRPr>
             </a:p>
             <a:p>
-              <a:pPr algn="ctr"/>
+              <a:pPr algn="just"/>
               <a:r>
                 <a:rPr lang="en-US" sz="3000" b="1" i="1" dirty="0"/>
                 <a:t>Saccharomyces </a:t>
@@ -4014,12 +4014,36 @@
                 <a:t>, also known as the budding yeast, can be used to study the cellular aging process as a model for aging of human cells. Past studies have concluded that there is a strong connection between the presence of </a:t>
               </a:r>
               <a:r>
-                <a:rPr lang="en-US" sz="3000" b="1" dirty="0" err="1"/>
+                <a:rPr lang="en-US" sz="3000" b="1" dirty="0" err="1" smtClean="0"/>
                 <a:t>superoxides</a:t>
               </a:r>
               <a:r>
+                <a:rPr lang="en-US" sz="3000" b="1" dirty="0" smtClean="0"/>
+                <a:t> </a:t>
+              </a:r>
+              <a:r>
                 <a:rPr lang="en-US" sz="3000" b="1" dirty="0"/>
-                <a:t>, and cellular aging. This study investigates how the presence of hydrogen peroxide on the outside of the cell influences the amount of hydrogen peroxide inside of the cell. The hydrogen peroxide acts as a stress inhibitor and the cell wants to the keep a balance of between the levels of intercellular and intracellular peroxide by trying to maintain homeostasis. The intracellular levels are detected by </a:t>
+                <a:t>and cellular aging. This study investigates how the presence of hydrogen peroxide on the outside of the cell influences the amount of hydrogen peroxide inside of the cell. The hydrogen peroxide </a:t>
+              </a:r>
+              <a:r>
+                <a:rPr lang="en-US" sz="3000" b="1" dirty="0" smtClean="0"/>
+                <a:t>represents </a:t>
+              </a:r>
+              <a:r>
+                <a:rPr lang="en-US" sz="3000" b="1" dirty="0" smtClean="0"/>
+                <a:t>stress which causes the cell to aim for a balance between intracellular and intercellular levels. </a:t>
+              </a:r>
+              <a:r>
+                <a:rPr lang="en-US" sz="3000" b="1" dirty="0"/>
+                <a:t>The intracellular levels </a:t>
+              </a:r>
+              <a:r>
+                <a:rPr lang="en-US" sz="3000" b="1" dirty="0" smtClean="0"/>
+                <a:t>of superoxide anions are monitored </a:t>
+              </a:r>
+              <a:r>
+                <a:rPr lang="en-US" sz="3000" b="1" dirty="0"/>
+                <a:t>by </a:t>
               </a:r>
               <a:r>
                 <a:rPr lang="en-US" sz="3000" b="1" dirty="0" err="1"/>
@@ -4031,10 +4055,14 @@
               </a:r>
               <a:r>
                 <a:rPr lang="en-US" sz="3000" b="1" dirty="0" smtClean="0"/>
-                <a:t>d </a:t>
+                <a:t>that </a:t>
               </a:r>
               <a:r>
-                <a:rPr lang="en-US" sz="3000" b="1" dirty="0"/>
+                <a:rPr lang="en-US" sz="3000" b="1" dirty="0" smtClean="0"/>
+                <a:t>peroxide levels are monitored </a:t>
+              </a:r>
+              <a:r>
+                <a:rPr lang="en-US" sz="3000" b="1" dirty="0" smtClean="0"/>
                 <a:t>by </a:t>
               </a:r>
               <a:r>
@@ -4046,16 +4074,33 @@
                 <a:t> (DHR; green). DHR and DHE are florescent probes that can be detected by </a:t>
               </a:r>
               <a:r>
-                <a:rPr lang="en-US" sz="3000" b="1" dirty="0" err="1"/>
+                <a:rPr lang="en-US" sz="3000" b="1" dirty="0" err="1" smtClean="0"/>
                 <a:t>flowcytometry</a:t>
               </a:r>
               <a:r>
+                <a:rPr lang="en-US" sz="3000" b="1" dirty="0" smtClean="0"/>
+                <a:t>. </a:t>
+              </a:r>
+              <a:r>
                 <a:rPr lang="en-US" sz="3000" b="1" dirty="0"/>
-                <a:t> —the use of lasers to detect different aspects between cells. The presence of hydrogen peroxide increases the coefficient variation that represents the DHE and DHR. Those increases represent a growing population of cells due to the induction of heterogeneity. Those increases by caused a decrease in the robustness of the cells</a:t>
+                <a:t>The presence of hydrogen peroxide increases the coefficient variation that represents the DHE and </a:t>
               </a:r>
+              <a:r>
+                <a:rPr lang="en-US" sz="3000" b="1" dirty="0" smtClean="0"/>
+                <a:t>DHR. Those increases cause </a:t>
+              </a:r>
+              <a:r>
+                <a:rPr lang="en-US" sz="3000" b="1" dirty="0"/>
+                <a:t>a decrease in the robustness of the </a:t>
+              </a:r>
+              <a:r>
+                <a:rPr lang="en-US" sz="3000" b="1" dirty="0" smtClean="0"/>
+                <a:t>cells.</a:t>
+              </a:r>
+              <a:endParaRPr lang="en-US" sz="3000" b="1" dirty="0"/>
             </a:p>
             <a:p>
-              <a:pPr algn="ctr"/>
+              <a:pPr algn="just"/>
               <a:endParaRPr lang="en-US" sz="4400" b="1" dirty="0" smtClean="0">
                 <a:solidFill>
                   <a:schemeClr val="tx2">
@@ -4742,7 +4787,7 @@
         <p:spPr>
           <a:xfrm>
             <a:off x="26517600" y="24765000"/>
-            <a:ext cx="10668000" cy="5555653"/>
+            <a:ext cx="10668000" cy="5063211"/>
           </a:xfrm>
           <a:prstGeom prst="rect">
             <a:avLst/>
@@ -4816,7 +4861,77 @@
                 <a:latin typeface="Arial"/>
                 <a:cs typeface="Arial"/>
               </a:rPr>
-              <a:t>levels inside the yeast cells. The treatment acts as a stress inhibitor and as the cell goes through more stress the CV increases which means the cell is losing its robustness therefore the cells are aging.</a:t>
+              <a:t>levels </a:t>
+            </a:r>
+            <a:r>
+              <a:rPr lang="en-US" sz="3200" b="1" dirty="0" smtClean="0">
+                <a:latin typeface="Arial"/>
+                <a:cs typeface="Arial"/>
+              </a:rPr>
+              <a:t>of </a:t>
+            </a:r>
+            <a:r>
+              <a:rPr lang="en-US" sz="3200" b="1" dirty="0" smtClean="0">
+                <a:latin typeface="Arial"/>
+                <a:cs typeface="Arial"/>
+              </a:rPr>
+              <a:t>the </a:t>
+            </a:r>
+            <a:r>
+              <a:rPr lang="en-US" sz="3200" b="1" dirty="0" smtClean="0">
+                <a:latin typeface="Arial"/>
+                <a:cs typeface="Arial"/>
+              </a:rPr>
+              <a:t>yeast cells. The treatment acts as a stress </a:t>
+            </a:r>
+            <a:r>
+              <a:rPr lang="en-US" sz="3200" b="1" dirty="0" smtClean="0">
+                <a:latin typeface="Arial"/>
+                <a:cs typeface="Arial"/>
+              </a:rPr>
+              <a:t>and </a:t>
+            </a:r>
+            <a:r>
+              <a:rPr lang="en-US" sz="3200" b="1" dirty="0" smtClean="0">
+                <a:latin typeface="Arial"/>
+                <a:cs typeface="Arial"/>
+              </a:rPr>
+              <a:t>causes </a:t>
+            </a:r>
+            <a:r>
+              <a:rPr lang="en-US" sz="3200" b="1" dirty="0" smtClean="0">
+                <a:latin typeface="Arial"/>
+                <a:cs typeface="Arial"/>
+              </a:rPr>
+              <a:t>the </a:t>
+            </a:r>
+            <a:r>
+              <a:rPr lang="en-US" sz="3200" b="1" dirty="0" smtClean="0">
+                <a:latin typeface="Arial"/>
+                <a:cs typeface="Arial"/>
+              </a:rPr>
+              <a:t>CV </a:t>
+            </a:r>
+            <a:r>
+              <a:rPr lang="en-US" sz="3200" b="1" smtClean="0">
+                <a:latin typeface="Arial"/>
+                <a:cs typeface="Arial"/>
+              </a:rPr>
+              <a:t>to increase which </a:t>
+            </a:r>
+            <a:r>
+              <a:rPr lang="en-US" sz="3200" b="1" dirty="0" smtClean="0">
+                <a:latin typeface="Arial"/>
+                <a:cs typeface="Arial"/>
+              </a:rPr>
+              <a:t>means the cell is losing its </a:t>
+            </a:r>
+            <a:r>
+              <a:rPr lang="en-US" sz="3200" b="1" dirty="0" smtClean="0">
+                <a:latin typeface="Arial"/>
+                <a:cs typeface="Arial"/>
+              </a:rPr>
+              <a:t>robustness.</a:t>
             </a:r>
             <a:endParaRPr lang="en-US" sz="3200" b="1" dirty="0">
               <a:solidFill>
@@ -4841,32 +4956,6 @@
           </a:p>
         </p:txBody>
       </p:sp>
-      <p:pic>
-        <p:nvPicPr>
-          <p:cNvPr id="1026" name="Picture 2" descr="https://encrypted-tbn1.gstatic.com/images?q=tbn:ANd9GcRvhms-DDr8QgQRXSKqOlNt2QeXRfHQeZn-zN_BcRqvp284GasE"/>
-          <p:cNvPicPr>
-            <a:picLocks noChangeAspect="1" noChangeArrowheads="1"/>
-          </p:cNvPicPr>
-          <p:nvPr/>
-        </p:nvPicPr>
-        <p:blipFill>
-          <a:blip r:embed="rId5" cstate="print"/>
-          <a:srcRect/>
-          <a:stretch>
-            <a:fillRect/>
-          </a:stretch>
-        </p:blipFill>
-        <p:spPr bwMode="auto">
-          <a:xfrm>
-            <a:off x="31775400" y="2438400"/>
-            <a:ext cx="3892054" cy="1219200"/>
-          </a:xfrm>
-          <a:prstGeom prst="rect">
-            <a:avLst/>
-          </a:prstGeom>
-          <a:noFill/>
-        </p:spPr>
-      </p:pic>
       <p:grpSp>
         <p:nvGrpSpPr>
           <p:cNvPr id="183" name="Group 182"/>
@@ -4876,9 +4965,9 @@
         <p:grpSpPr>
           <a:xfrm>
             <a:off x="685800" y="15240000"/>
-            <a:ext cx="12792247" cy="8787245"/>
+            <a:ext cx="12792247" cy="8294801"/>
             <a:chOff x="13730252" y="4800600"/>
-            <a:chExt cx="11263348" cy="10593969"/>
+            <a:chExt cx="11263348" cy="10000275"/>
           </a:xfrm>
         </p:grpSpPr>
         <p:grpSp>
@@ -4999,7 +5088,7 @@
           <p:spPr>
             <a:xfrm>
               <a:off x="13730252" y="4832238"/>
-              <a:ext cx="11070305" cy="10562331"/>
+              <a:ext cx="11070305" cy="9968637"/>
             </a:xfrm>
             <a:prstGeom prst="rect">
               <a:avLst/>
@@ -5042,7 +5131,15 @@
               <a:pPr algn="ctr"/>
               <a:r>
                 <a:rPr lang="en-US" sz="3200" b="1" dirty="0"/>
-                <a:t>One of the main causes for cellular and physiological aging is the introduction of reactive oxygen species. They are chemical reactive ions that contain oxygen, and in this case H</a:t>
+                <a:t>One of the main causes for cellular and physiological aging is the introduction of reactive oxygen </a:t>
+              </a:r>
+              <a:r>
+                <a:rPr lang="en-US" sz="3200" b="1" dirty="0" smtClean="0"/>
+                <a:t>species </a:t>
+              </a:r>
+              <a:r>
+                <a:rPr lang="en-US" sz="3200" b="1" dirty="0"/>
+                <a:t>like H</a:t>
               </a:r>
               <a:r>
                 <a:rPr lang="en-US" sz="3200" b="1" baseline="-25000" dirty="0"/>
@@ -5054,7 +5151,27 @@
               </a:r>
               <a:r>
                 <a:rPr lang="en-US" sz="3200" b="1" baseline="-25000" dirty="0"/>
-                <a:t>2,</a:t>
+                <a:t>2</a:t>
+              </a:r>
+              <a:r>
+                <a:rPr lang="en-US" sz="3200" b="1" dirty="0" smtClean="0"/>
+                <a:t>. H</a:t>
+              </a:r>
+              <a:r>
+                <a:rPr lang="en-US" sz="3200" b="1" baseline="-25000" dirty="0" smtClean="0"/>
+                <a:t>2</a:t>
+              </a:r>
+              <a:r>
+                <a:rPr lang="en-US" sz="3200" b="1" dirty="0" smtClean="0"/>
+                <a:t>O</a:t>
+              </a:r>
+              <a:r>
+                <a:rPr lang="en-US" sz="3200" b="1" baseline="-25000" dirty="0" smtClean="0"/>
+                <a:t>2</a:t>
+              </a:r>
+              <a:r>
+                <a:rPr lang="en-US" sz="3200" b="1" baseline="-25000" dirty="0"/>
+                <a:t>,</a:t>
               </a:r>
               <a:r>
                 <a:rPr lang="en-US" sz="3200" b="1" dirty="0"/>
@@ -5074,7 +5191,39 @@
               </a:r>
               <a:r>
                 <a:rPr lang="en-US" sz="3200" b="1" dirty="0"/>
-                <a:t> radicals because they recognize the peroxide as a threat. The overproduction of the radicals creates damage in macromolecules such as proteins, DNA and RNA. DNA and RNA function as the instructions for the production of specific proteins that keep the cell healthy and function properly, but as the instructions are destroyed, the cell begins the age due to its lack of stability. As the cell ages, the probability of developing diseases, such as cancer and Alzheimer’s, increases.</a:t>
+                <a:t> radicals because they recognize the peroxide as a threat. The overproduction of the radicals creates damage in </a:t>
+              </a:r>
+              <a:r>
+                <a:rPr lang="en-US" sz="3200" b="1" dirty="0" smtClean="0"/>
+                <a:t>the macromolecules </a:t>
+              </a:r>
+              <a:r>
+                <a:rPr lang="en-US" sz="3200" b="1" dirty="0"/>
+                <a:t>such as proteins, DNA and RNA. DNA and RNA function as the instructions for the production of specific proteins that keep the cell healthy and </a:t>
+              </a:r>
+              <a:r>
+                <a:rPr lang="en-US" sz="3200" b="1" dirty="0" smtClean="0"/>
+                <a:t>functioning </a:t>
+              </a:r>
+              <a:r>
+                <a:rPr lang="en-US" sz="3200" b="1" dirty="0"/>
+                <a:t>properly, but as the </a:t>
+              </a:r>
+              <a:r>
+                <a:rPr lang="en-US" sz="3200" b="1" dirty="0" smtClean="0"/>
+                <a:t>instructions </a:t>
+              </a:r>
+              <a:r>
+                <a:rPr lang="en-US" sz="3200" b="1" dirty="0"/>
+                <a:t>are destroyed, the cell begins </a:t>
+              </a:r>
+              <a:r>
+                <a:rPr lang="en-US" sz="3200" b="1" dirty="0" smtClean="0"/>
+                <a:t>aging due </a:t>
+              </a:r>
+              <a:r>
+                <a:rPr lang="en-US" sz="3200" b="1" dirty="0"/>
+                <a:t>to its lack of stability. As the cell ages, the probability of developing diseases, such as cancer and Alzheimer’s, increases.</a:t>
               </a:r>
             </a:p>
             <a:p>
@@ -5648,7 +5797,7 @@
           <p:nvPr/>
         </p:nvPicPr>
         <p:blipFill>
-          <a:blip r:embed="rId6" cstate="print"/>
+          <a:blip r:embed="rId5" cstate="print"/>
           <a:srcRect l="4364" t="12444" b="11111"/>
           <a:stretch>
             <a:fillRect/>
@@ -5674,7 +5823,7 @@
           <p:nvPr/>
         </p:nvPicPr>
         <p:blipFill>
-          <a:blip r:embed="rId7" cstate="print"/>
+          <a:blip r:embed="rId6" cstate="print"/>
           <a:srcRect l="4364" t="12444" b="12889"/>
           <a:stretch>
             <a:fillRect/>
@@ -6275,10 +6424,10 @@
         </p:nvGrpSpPr>
         <p:grpSpPr>
           <a:xfrm>
-            <a:off x="762000" y="32842198"/>
-            <a:ext cx="12573000" cy="3733802"/>
+            <a:off x="762000" y="32842197"/>
+            <a:ext cx="12573000" cy="3284276"/>
             <a:chOff x="838200" y="31699200"/>
-            <a:chExt cx="12420600" cy="4764631"/>
+            <a:chExt cx="12420600" cy="4191000"/>
           </a:xfrm>
           <a:solidFill>
             <a:srgbClr val="FFFFFF"/>
@@ -6401,7 +6550,7 @@
           <p:spPr>
             <a:xfrm>
               <a:off x="1295400" y="32080199"/>
-              <a:ext cx="11277600" cy="4383632"/>
+              <a:ext cx="11277600" cy="2847786"/>
             </a:xfrm>
             <a:prstGeom prst="rect">
               <a:avLst/>
@@ -6438,17 +6587,21 @@
             <a:p>
               <a:pPr algn="just"/>
               <a:r>
+                <a:rPr lang="en-US" sz="3200" b="1" dirty="0" smtClean="0"/>
+                <a:t>We hypothesize that the use of ectopic hydrogen peroxide treatments </a:t>
+              </a:r>
+              <a:r>
                 <a:rPr lang="en-US" sz="3200" b="1" dirty="0"/>
-                <a:t>If the yeast cells come in contact with different doses of hydrogen peroxide their oxidative stress will be induced then the cells will age faster. </a:t>
+                <a:t>in a dose-dependent </a:t>
+              </a:r>
+              <a:r>
+                <a:rPr lang="en-US" sz="3200" b="1" dirty="0" smtClean="0"/>
+                <a:t>way can influence the robustness of cells.</a:t>
               </a:r>
               <a:endParaRPr lang="en-US" sz="3200" b="1" dirty="0" smtClean="0">
                 <a:solidFill>
-                  <a:schemeClr val="tx2">
-                    <a:lumMod val="75000"/>
-                  </a:schemeClr>
-                </a:solidFill>
-                <a:latin typeface="Arial" pitchFamily="34" charset="0"/>
-                <a:cs typeface="Arial" pitchFamily="34" charset="0"/>
+                  <a:srgbClr val="FF0000"/>
+                </a:solidFill>
               </a:endParaRPr>
             </a:p>
           </p:txBody>
@@ -6677,7 +6830,7 @@
               <p:nvPr/>
             </p:nvPicPr>
             <p:blipFill>
-              <a:blip r:embed="rId8" cstate="print"/>
+              <a:blip r:embed="rId7" cstate="print"/>
               <a:srcRect r="15152" b="5660"/>
               <a:stretch>
                 <a:fillRect/>
@@ -7114,7 +7267,7 @@
               <p:nvPr/>
             </p:nvPicPr>
             <p:blipFill>
-              <a:blip r:embed="rId8" cstate="print"/>
+              <a:blip r:embed="rId7" cstate="print"/>
               <a:srcRect r="15152" b="5660"/>
               <a:stretch>
                 <a:fillRect/>
@@ -7551,7 +7704,7 @@
               <p:nvPr/>
             </p:nvPicPr>
             <p:blipFill>
-              <a:blip r:embed="rId8" cstate="print"/>
+              <a:blip r:embed="rId7" cstate="print"/>
               <a:srcRect r="15152" b="5660"/>
               <a:stretch>
                 <a:fillRect/>
@@ -7988,7 +8141,7 @@
               <p:nvPr/>
             </p:nvPicPr>
             <p:blipFill>
-              <a:blip r:embed="rId8" cstate="print"/>
+              <a:blip r:embed="rId7" cstate="print"/>
               <a:srcRect r="15152" b="5660"/>
               <a:stretch>
                 <a:fillRect/>
@@ -8425,7 +8578,7 @@
               <p:nvPr/>
             </p:nvPicPr>
             <p:blipFill>
-              <a:blip r:embed="rId8" cstate="print"/>
+              <a:blip r:embed="rId7" cstate="print"/>
               <a:srcRect r="15152" b="5660"/>
               <a:stretch>
                 <a:fillRect/>
@@ -8862,7 +9015,7 @@
               <p:nvPr/>
             </p:nvPicPr>
             <p:blipFill>
-              <a:blip r:embed="rId8" cstate="print"/>
+              <a:blip r:embed="rId7" cstate="print"/>
               <a:srcRect r="15152" b="5660"/>
               <a:stretch>
                 <a:fillRect/>
@@ -9687,7 +9840,7 @@
         </p:nvSpPr>
         <p:spPr>
           <a:xfrm>
-            <a:off x="14249400" y="10395327"/>
+            <a:off x="14249400" y="10287000"/>
             <a:ext cx="4648200" cy="954107"/>
           </a:xfrm>
           <a:prstGeom prst="rect">
@@ -9738,7 +9891,7 @@
           <p:nvPr/>
         </p:nvPicPr>
         <p:blipFill>
-          <a:blip r:embed="rId9" cstate="print"/>
+          <a:blip r:embed="rId8" cstate="print"/>
           <a:srcRect/>
           <a:stretch>
             <a:fillRect/>
@@ -9764,7 +9917,7 @@
           <p:nvPr/>
         </p:nvPicPr>
         <p:blipFill>
-          <a:blip r:embed="rId10" cstate="print"/>
+          <a:blip r:embed="rId9" cstate="print"/>
           <a:srcRect/>
           <a:stretch>
             <a:fillRect/>
@@ -9772,7 +9925,7 @@
         </p:blipFill>
         <p:spPr bwMode="auto">
           <a:xfrm>
-            <a:off x="15697200" y="9372600"/>
+            <a:off x="15697200" y="9296400"/>
             <a:ext cx="1952613" cy="1058055"/>
           </a:xfrm>
           <a:prstGeom prst="rect">
@@ -9990,31 +10143,37 @@
               <a:rPr lang="en-US" sz="3200" b="1" dirty="0" smtClean="0">
                 <a:cs typeface="Times New Roman" pitchFamily="18" charset="0"/>
               </a:rPr>
-              <a:t>The strain BY4743 was grown, the cells were restaged, a </a:t>
+              <a:t>The strain BY4743 was grown, the cells were restaged</a:t>
+            </a:r>
+            <a:r>
+              <a:rPr lang="en-US" sz="3200" b="1" dirty="0" smtClean="0">
+                <a:cs typeface="Times New Roman" pitchFamily="18" charset="0"/>
+              </a:rPr>
+              <a:t>, hydrogen </a:t>
             </a:r>
             <a:r>
               <a:rPr lang="en-US" sz="3200" b="1" dirty="0">
                 <a:cs typeface="Times New Roman" pitchFamily="18" charset="0"/>
               </a:rPr>
-              <a:t>hydrogen peroxide </a:t>
+              <a:t>peroxide </a:t>
             </a:r>
             <a:r>
               <a:rPr lang="en-US" sz="3200" b="1" dirty="0" smtClean="0">
                 <a:cs typeface="Times New Roman" pitchFamily="18" charset="0"/>
               </a:rPr>
-              <a:t>treatment was performed, a </a:t>
-            </a:r>
-            <a:r>
-              <a:rPr lang="en-US" sz="3200" b="1" dirty="0">
-                <a:cs typeface="Times New Roman" pitchFamily="18" charset="0"/>
-              </a:rPr>
-              <a:t>D</a:t>
+              <a:t>treatments were </a:t>
             </a:r>
             <a:r>
               <a:rPr lang="en-US" sz="3200" b="1" dirty="0" smtClean="0">
                 <a:cs typeface="Times New Roman" pitchFamily="18" charset="0"/>
               </a:rPr>
-              <a:t>HR </a:t>
+              <a:t>performed, </a:t>
+            </a:r>
+            <a:r>
+              <a:rPr lang="en-US" sz="3200" b="1" dirty="0" smtClean="0">
+                <a:cs typeface="Times New Roman" pitchFamily="18" charset="0"/>
+              </a:rPr>
+              <a:t>DHR </a:t>
             </a:r>
             <a:r>
               <a:rPr lang="en-US" sz="3200" b="1" dirty="0">
@@ -10050,13 +10209,31 @@
               <a:rPr lang="en-US" sz="3200" b="1" dirty="0" smtClean="0">
                 <a:cs typeface="Times New Roman" pitchFamily="18" charset="0"/>
               </a:rPr>
-              <a:t>were both labeled in </a:t>
+              <a:t>were both </a:t>
+            </a:r>
+            <a:r>
+              <a:rPr lang="en-US" sz="3200" b="1" dirty="0" smtClean="0">
+                <a:cs typeface="Times New Roman" pitchFamily="18" charset="0"/>
+              </a:rPr>
+              <a:t>monitored </a:t>
+            </a:r>
+            <a:r>
+              <a:rPr lang="en-US" sz="3200" b="1" dirty="0" smtClean="0">
+                <a:cs typeface="Times New Roman" pitchFamily="18" charset="0"/>
+              </a:rPr>
+              <a:t>in </a:t>
+            </a:r>
+            <a:r>
+              <a:rPr lang="en-US" sz="3200" b="1" dirty="0" err="1">
+                <a:cs typeface="Times New Roman" pitchFamily="18" charset="0"/>
+              </a:rPr>
+              <a:t>C</a:t>
             </a:r>
             <a:r>
               <a:rPr lang="en-US" sz="3200" b="1" dirty="0" err="1" smtClean="0">
                 <a:cs typeface="Times New Roman" pitchFamily="18" charset="0"/>
               </a:rPr>
-              <a:t>calibur</a:t>
+              <a:t>alibur</a:t>
             </a:r>
             <a:r>
               <a:rPr lang="en-US" sz="3200" b="1" dirty="0" smtClean="0">
@@ -10074,19 +10251,25 @@
               <a:rPr lang="en-US" sz="3200" b="1" dirty="0" smtClean="0">
                 <a:cs typeface="Times New Roman" pitchFamily="18" charset="0"/>
               </a:rPr>
-              <a:t>Also, DHR was left overnight to see if the results would change, </a:t>
-            </a:r>
-            <a:r>
-              <a:rPr lang="en-US" sz="3200" b="1" dirty="0">
-                <a:cs typeface="Times New Roman" pitchFamily="18" charset="0"/>
-              </a:rPr>
-              <a:t>A</a:t>
+              <a:t>Also, DHR was left overnight to see if the results would </a:t>
             </a:r>
             <a:r>
               <a:rPr lang="en-US" sz="3200" b="1" dirty="0" smtClean="0">
                 <a:cs typeface="Times New Roman" pitchFamily="18" charset="0"/>
               </a:rPr>
-              <a:t> </a:t>
+              <a:t>change</a:t>
+            </a:r>
+            <a:r>
+              <a:rPr lang="en-US" sz="3200" b="1" dirty="0" smtClean="0">
+                <a:cs typeface="Times New Roman" pitchFamily="18" charset="0"/>
+              </a:rPr>
+              <a:t>. </a:t>
+            </a:r>
+            <a:r>
+              <a:rPr lang="en-US" sz="3200" b="1" dirty="0" smtClean="0">
+                <a:cs typeface="Times New Roman" pitchFamily="18" charset="0"/>
+              </a:rPr>
+              <a:t>A </a:t>
             </a:r>
             <a:r>
               <a:rPr lang="en-US" sz="3200" b="1" dirty="0" smtClean="0">
@@ -10096,18 +10279,46 @@
               <a:t>FACS </a:t>
             </a:r>
             <a:r>
+              <a:rPr lang="en-US" sz="3200" b="1" dirty="0" err="1">
+                <a:ea typeface="Calibri" pitchFamily="34" charset="0"/>
+                <a:cs typeface="Times New Roman" pitchFamily="18" charset="0"/>
+              </a:rPr>
+              <a:t>C</a:t>
+            </a:r>
+            <a:r>
               <a:rPr lang="en-US" sz="3200" b="1" dirty="0" err="1" smtClean="0">
                 <a:ea typeface="Calibri" pitchFamily="34" charset="0"/>
                 <a:cs typeface="Times New Roman" pitchFamily="18" charset="0"/>
               </a:rPr>
-              <a:t>calibur</a:t>
+              <a:t>alibur</a:t>
             </a:r>
             <a:r>
               <a:rPr lang="en-US" sz="3200" b="1" dirty="0" smtClean="0">
                 <a:ea typeface="Calibri" pitchFamily="34" charset="0"/>
                 <a:cs typeface="Times New Roman" pitchFamily="18" charset="0"/>
               </a:rPr>
-              <a:t> was used to collect data that was later analyzed using R studio and different other packages provided by </a:t>
+              <a:t> </a:t>
+            </a:r>
+            <a:r>
+              <a:rPr lang="en-US" sz="3200" b="1" dirty="0" smtClean="0">
+                <a:ea typeface="Calibri" pitchFamily="34" charset="0"/>
+                <a:cs typeface="Times New Roman" pitchFamily="18" charset="0"/>
+              </a:rPr>
+              <a:t>was used to collect data that was later analyzed using R studio and </a:t>
+            </a:r>
+            <a:r>
+              <a:rPr lang="en-US" sz="3200" b="1" dirty="0" smtClean="0">
+                <a:ea typeface="Calibri" pitchFamily="34" charset="0"/>
+                <a:cs typeface="Times New Roman" pitchFamily="18" charset="0"/>
+              </a:rPr>
+              <a:t>other </a:t>
+            </a:r>
+            <a:r>
+              <a:rPr lang="en-US" sz="3200" b="1" dirty="0" smtClean="0">
+                <a:ea typeface="Calibri" pitchFamily="34" charset="0"/>
+                <a:cs typeface="Times New Roman" pitchFamily="18" charset="0"/>
+              </a:rPr>
+              <a:t>packages provided by </a:t>
             </a:r>
             <a:r>
               <a:rPr lang="en-US" sz="3200" b="1" dirty="0" err="1" smtClean="0">
@@ -10146,7 +10357,7 @@
           <p:nvPr/>
         </p:nvPicPr>
         <p:blipFill>
-          <a:blip r:embed="rId11" cstate="print"/>
+          <a:blip r:embed="rId10" cstate="print"/>
           <a:srcRect/>
           <a:stretch>
             <a:fillRect/>
@@ -10356,7 +10567,7 @@
           <p:nvPr/>
         </p:nvPicPr>
         <p:blipFill>
-          <a:blip r:embed="rId6" cstate="print"/>
+          <a:blip r:embed="rId5" cstate="print"/>
           <a:srcRect l="4364" t="12444" b="11111"/>
           <a:stretch>
             <a:fillRect/>
@@ -10382,7 +10593,7 @@
           <p:nvPr/>
         </p:nvPicPr>
         <p:blipFill>
-          <a:blip r:embed="rId7" cstate="print"/>
+          <a:blip r:embed="rId6" cstate="print"/>
           <a:srcRect l="4364" t="12444" b="12889"/>
           <a:stretch>
             <a:fillRect/>
@@ -10713,7 +10924,7 @@
         <p:spPr>
           <a:xfrm>
             <a:off x="26212801" y="15087600"/>
-            <a:ext cx="10972800" cy="8817798"/>
+            <a:ext cx="10972800" cy="7494359"/>
           </a:xfrm>
           <a:prstGeom prst="rect">
             <a:avLst/>
@@ -10803,7 +11014,14 @@
                 <a:latin typeface="Arial" pitchFamily="34" charset="0"/>
                 <a:cs typeface="Arial" pitchFamily="34" charset="0"/>
               </a:rPr>
-              <a:t>A scale conversion was used so that the data is shaped in more of bell curve. The introduction of hydrogen peroxide decreases the overall coefficient variation </a:t>
+              <a:t>The </a:t>
+            </a:r>
+            <a:r>
+              <a:rPr lang="en-US" sz="4300" b="1" dirty="0" smtClean="0">
+                <a:latin typeface="Arial" pitchFamily="34" charset="0"/>
+                <a:cs typeface="Arial" pitchFamily="34" charset="0"/>
+              </a:rPr>
+              <a:t>introduction of hydrogen peroxide decreases the overall coefficient variation </a:t>
             </a:r>
             <a:r>
               <a:rPr lang="en-US" sz="4300" b="1" dirty="0" smtClean="0">
@@ -10843,7 +11061,7 @@
           <p:nvPr/>
         </p:nvPicPr>
         <p:blipFill>
-          <a:blip r:embed="rId12" cstate="print"/>
+          <a:blip r:embed="rId11" cstate="print"/>
           <a:srcRect/>
           <a:stretch>
             <a:fillRect/>
@@ -10869,7 +11087,7 @@
           <p:nvPr/>
         </p:nvPicPr>
         <p:blipFill>
-          <a:blip r:embed="rId13"/>
+          <a:blip r:embed="rId12"/>
           <a:stretch>
             <a:fillRect/>
           </a:stretch>
@@ -10893,7 +11111,7 @@
           <p:nvPr/>
         </p:nvPicPr>
         <p:blipFill>
-          <a:blip r:embed="rId14"/>
+          <a:blip r:embed="rId13"/>
           <a:stretch>
             <a:fillRect/>
           </a:stretch>
@@ -10917,7 +11135,7 @@
           <p:nvPr/>
         </p:nvPicPr>
         <p:blipFill>
-          <a:blip r:embed="rId15">
+          <a:blip r:embed="rId14">
             <a:extLst>
               <a:ext uri="{28A0092B-C50C-407E-A947-70E740481C1C}">
                 <a14:useLocalDpi xmlns:a14="http://schemas.microsoft.com/office/drawing/2010/main" val="0"/>
@@ -10947,7 +11165,7 @@
           <p:nvPr/>
         </p:nvPicPr>
         <p:blipFill>
-          <a:blip r:embed="rId16">
+          <a:blip r:embed="rId15">
             <a:extLst>
               <a:ext uri="{28A0092B-C50C-407E-A947-70E740481C1C}">
                 <a14:useLocalDpi xmlns:a14="http://schemas.microsoft.com/office/drawing/2010/main" val="0"/>
@@ -10977,7 +11195,7 @@
           <p:nvPr/>
         </p:nvPicPr>
         <p:blipFill>
-          <a:blip r:embed="rId17">
+          <a:blip r:embed="rId16">
             <a:extLst>
               <a:ext uri="{28A0092B-C50C-407E-A947-70E740481C1C}">
                 <a14:useLocalDpi xmlns:a14="http://schemas.microsoft.com/office/drawing/2010/main" val="0"/>
@@ -11007,7 +11225,7 @@
           <p:nvPr/>
         </p:nvPicPr>
         <p:blipFill>
-          <a:blip r:embed="rId18">
+          <a:blip r:embed="rId17">
             <a:extLst>
               <a:ext uri="{28A0092B-C50C-407E-A947-70E740481C1C}">
                 <a14:useLocalDpi xmlns:a14="http://schemas.microsoft.com/office/drawing/2010/main" val="0"/>

</xml_diff>